<commit_message>
Case study PPT is updated
</commit_message>
<xml_diff>
--- a/LendingClubCaseStudy_AmeyaParab.pptx
+++ b/LendingClubCaseStudy_AmeyaParab.pptx
@@ -9,6 +9,19 @@
     <p:sldId id="257" r:id="rId3"/>
     <p:sldId id="258" r:id="rId4"/>
     <p:sldId id="259" r:id="rId5"/>
+    <p:sldId id="260" r:id="rId6"/>
+    <p:sldId id="261" r:id="rId7"/>
+    <p:sldId id="262" r:id="rId8"/>
+    <p:sldId id="263" r:id="rId9"/>
+    <p:sldId id="264" r:id="rId10"/>
+    <p:sldId id="265" r:id="rId11"/>
+    <p:sldId id="266" r:id="rId12"/>
+    <p:sldId id="267" r:id="rId13"/>
+    <p:sldId id="268" r:id="rId14"/>
+    <p:sldId id="269" r:id="rId15"/>
+    <p:sldId id="270" r:id="rId16"/>
+    <p:sldId id="271" r:id="rId17"/>
+    <p:sldId id="272" r:id="rId18"/>
   </p:sldIdLst>
   <p:sldSz cx="9144000" cy="6858000" type="screen4x3"/>
   <p:notesSz cx="6858000" cy="9144000"/>
@@ -5098,6 +5111,925 @@
 </p:sld>
 </file>
 
+<file path=ppt/slides/slide10.xml><?xml version="1.0" encoding="utf-8"?>
+<p:sld xmlns:a="http://schemas.openxmlformats.org/drawingml/2006/main" xmlns:r="http://schemas.openxmlformats.org/officeDocument/2006/relationships" xmlns:p="http://schemas.openxmlformats.org/presentationml/2006/main">
+  <p:cSld>
+    <p:spTree>
+      <p:nvGrpSpPr>
+        <p:cNvPr id="1" name=""/>
+        <p:cNvGrpSpPr/>
+        <p:nvPr/>
+      </p:nvGrpSpPr>
+      <p:grpSpPr>
+        <a:xfrm>
+          <a:off x="0" y="0"/>
+          <a:ext cx="0" cy="0"/>
+          <a:chOff x="0" y="0"/>
+          <a:chExt cx="0" cy="0"/>
+        </a:xfrm>
+      </p:grpSpPr>
+      <p:sp>
+        <p:nvSpPr>
+          <p:cNvPr id="2" name="Title 1"/>
+          <p:cNvSpPr>
+            <a:spLocks noGrp="1"/>
+          </p:cNvSpPr>
+          <p:nvPr>
+            <p:ph type="title"/>
+          </p:nvPr>
+        </p:nvSpPr>
+        <p:spPr>
+          <a:xfrm>
+            <a:off x="457200" y="274638"/>
+            <a:ext cx="7467600" cy="715962"/>
+          </a:xfrm>
+        </p:spPr>
+        <p:txBody>
+          <a:bodyPr/>
+          <a:lstStyle/>
+          <a:p>
+            <a:r>
+              <a:rPr lang="en-IN" dirty="0" smtClean="0"/>
+              <a:t>Grade A</a:t>
+            </a:r>
+            <a:endParaRPr lang="en-US" dirty="0"/>
+          </a:p>
+        </p:txBody>
+      </p:sp>
+      <p:pic>
+        <p:nvPicPr>
+          <p:cNvPr id="4098" name="Picture 2"/>
+          <p:cNvPicPr>
+            <a:picLocks noChangeAspect="1" noChangeArrowheads="1"/>
+          </p:cNvPicPr>
+          <p:nvPr/>
+        </p:nvPicPr>
+        <p:blipFill>
+          <a:blip r:embed="rId2" cstate="print"/>
+          <a:srcRect/>
+          <a:stretch>
+            <a:fillRect/>
+          </a:stretch>
+        </p:blipFill>
+        <p:spPr bwMode="auto">
+          <a:xfrm>
+            <a:off x="76200" y="1066800"/>
+            <a:ext cx="8610600" cy="2974425"/>
+          </a:xfrm>
+          <a:prstGeom prst="rect">
+            <a:avLst/>
+          </a:prstGeom>
+          <a:noFill/>
+          <a:ln w="9525">
+            <a:noFill/>
+            <a:miter lim="800000"/>
+            <a:headEnd/>
+            <a:tailEnd/>
+          </a:ln>
+        </p:spPr>
+      </p:pic>
+      <p:pic>
+        <p:nvPicPr>
+          <p:cNvPr id="4099" name="Picture 3"/>
+          <p:cNvPicPr>
+            <a:picLocks noChangeAspect="1" noChangeArrowheads="1"/>
+          </p:cNvPicPr>
+          <p:nvPr/>
+        </p:nvPicPr>
+        <p:blipFill>
+          <a:blip r:embed="rId3" cstate="print"/>
+          <a:srcRect/>
+          <a:stretch>
+            <a:fillRect/>
+          </a:stretch>
+        </p:blipFill>
+        <p:spPr bwMode="auto">
+          <a:xfrm>
+            <a:off x="178508" y="3733800"/>
+            <a:ext cx="8432092" cy="1905000"/>
+          </a:xfrm>
+          <a:prstGeom prst="rect">
+            <a:avLst/>
+          </a:prstGeom>
+          <a:noFill/>
+          <a:ln w="9525">
+            <a:noFill/>
+            <a:miter lim="800000"/>
+            <a:headEnd/>
+            <a:tailEnd/>
+          </a:ln>
+        </p:spPr>
+      </p:pic>
+    </p:spTree>
+  </p:cSld>
+  <p:clrMapOvr>
+    <a:masterClrMapping/>
+  </p:clrMapOvr>
+</p:sld>
+</file>
+
+<file path=ppt/slides/slide11.xml><?xml version="1.0" encoding="utf-8"?>
+<p:sld xmlns:a="http://schemas.openxmlformats.org/drawingml/2006/main" xmlns:r="http://schemas.openxmlformats.org/officeDocument/2006/relationships" xmlns:p="http://schemas.openxmlformats.org/presentationml/2006/main">
+  <p:cSld>
+    <p:spTree>
+      <p:nvGrpSpPr>
+        <p:cNvPr id="1" name=""/>
+        <p:cNvGrpSpPr/>
+        <p:nvPr/>
+      </p:nvGrpSpPr>
+      <p:grpSpPr>
+        <a:xfrm>
+          <a:off x="0" y="0"/>
+          <a:ext cx="0" cy="0"/>
+          <a:chOff x="0" y="0"/>
+          <a:chExt cx="0" cy="0"/>
+        </a:xfrm>
+      </p:grpSpPr>
+      <p:sp>
+        <p:nvSpPr>
+          <p:cNvPr id="2" name="Title 1"/>
+          <p:cNvSpPr>
+            <a:spLocks noGrp="1"/>
+          </p:cNvSpPr>
+          <p:nvPr>
+            <p:ph type="title"/>
+          </p:nvPr>
+        </p:nvSpPr>
+        <p:spPr>
+          <a:xfrm>
+            <a:off x="457200" y="274638"/>
+            <a:ext cx="7467600" cy="639762"/>
+          </a:xfrm>
+        </p:spPr>
+        <p:txBody>
+          <a:bodyPr/>
+          <a:lstStyle/>
+          <a:p>
+            <a:r>
+              <a:rPr lang="en-IN" dirty="0" smtClean="0"/>
+              <a:t>Grade B</a:t>
+            </a:r>
+            <a:endParaRPr lang="en-US" dirty="0"/>
+          </a:p>
+        </p:txBody>
+      </p:sp>
+      <p:pic>
+        <p:nvPicPr>
+          <p:cNvPr id="5123" name="Picture 3"/>
+          <p:cNvPicPr>
+            <a:picLocks noChangeAspect="1" noChangeArrowheads="1"/>
+          </p:cNvPicPr>
+          <p:nvPr/>
+        </p:nvPicPr>
+        <p:blipFill>
+          <a:blip r:embed="rId2" cstate="print"/>
+          <a:srcRect/>
+          <a:stretch>
+            <a:fillRect/>
+          </a:stretch>
+        </p:blipFill>
+        <p:spPr bwMode="auto">
+          <a:xfrm>
+            <a:off x="304800" y="1066800"/>
+            <a:ext cx="8458200" cy="2800350"/>
+          </a:xfrm>
+          <a:prstGeom prst="rect">
+            <a:avLst/>
+          </a:prstGeom>
+          <a:noFill/>
+          <a:ln w="9525">
+            <a:noFill/>
+            <a:miter lim="800000"/>
+            <a:headEnd/>
+            <a:tailEnd/>
+          </a:ln>
+        </p:spPr>
+      </p:pic>
+      <p:pic>
+        <p:nvPicPr>
+          <p:cNvPr id="5124" name="Picture 4"/>
+          <p:cNvPicPr>
+            <a:picLocks noChangeAspect="1" noChangeArrowheads="1"/>
+          </p:cNvPicPr>
+          <p:nvPr/>
+        </p:nvPicPr>
+        <p:blipFill>
+          <a:blip r:embed="rId3" cstate="print"/>
+          <a:srcRect/>
+          <a:stretch>
+            <a:fillRect/>
+          </a:stretch>
+        </p:blipFill>
+        <p:spPr bwMode="auto">
+          <a:xfrm>
+            <a:off x="228600" y="4038600"/>
+            <a:ext cx="7391400" cy="1731979"/>
+          </a:xfrm>
+          <a:prstGeom prst="rect">
+            <a:avLst/>
+          </a:prstGeom>
+          <a:noFill/>
+          <a:ln w="9525">
+            <a:noFill/>
+            <a:miter lim="800000"/>
+            <a:headEnd/>
+            <a:tailEnd/>
+          </a:ln>
+        </p:spPr>
+      </p:pic>
+    </p:spTree>
+  </p:cSld>
+  <p:clrMapOvr>
+    <a:masterClrMapping/>
+  </p:clrMapOvr>
+</p:sld>
+</file>
+
+<file path=ppt/slides/slide12.xml><?xml version="1.0" encoding="utf-8"?>
+<p:sld xmlns:a="http://schemas.openxmlformats.org/drawingml/2006/main" xmlns:r="http://schemas.openxmlformats.org/officeDocument/2006/relationships" xmlns:p="http://schemas.openxmlformats.org/presentationml/2006/main">
+  <p:cSld>
+    <p:spTree>
+      <p:nvGrpSpPr>
+        <p:cNvPr id="1" name=""/>
+        <p:cNvGrpSpPr/>
+        <p:nvPr/>
+      </p:nvGrpSpPr>
+      <p:grpSpPr>
+        <a:xfrm>
+          <a:off x="0" y="0"/>
+          <a:ext cx="0" cy="0"/>
+          <a:chOff x="0" y="0"/>
+          <a:chExt cx="0" cy="0"/>
+        </a:xfrm>
+      </p:grpSpPr>
+      <p:sp>
+        <p:nvSpPr>
+          <p:cNvPr id="2" name="Title 1"/>
+          <p:cNvSpPr>
+            <a:spLocks noGrp="1"/>
+          </p:cNvSpPr>
+          <p:nvPr>
+            <p:ph type="title"/>
+          </p:nvPr>
+        </p:nvSpPr>
+        <p:spPr/>
+        <p:txBody>
+          <a:bodyPr/>
+          <a:lstStyle/>
+          <a:p>
+            <a:r>
+              <a:rPr lang="en-IN" dirty="0" smtClean="0"/>
+              <a:t>Grade C</a:t>
+            </a:r>
+            <a:endParaRPr lang="en-US" dirty="0"/>
+          </a:p>
+        </p:txBody>
+      </p:sp>
+      <p:pic>
+        <p:nvPicPr>
+          <p:cNvPr id="6146" name="Picture 2"/>
+          <p:cNvPicPr>
+            <a:picLocks noChangeAspect="1" noChangeArrowheads="1"/>
+          </p:cNvPicPr>
+          <p:nvPr/>
+        </p:nvPicPr>
+        <p:blipFill>
+          <a:blip r:embed="rId2" cstate="print"/>
+          <a:srcRect/>
+          <a:stretch>
+            <a:fillRect/>
+          </a:stretch>
+        </p:blipFill>
+        <p:spPr bwMode="auto">
+          <a:xfrm>
+            <a:off x="228600" y="1371600"/>
+            <a:ext cx="8534400" cy="3085239"/>
+          </a:xfrm>
+          <a:prstGeom prst="rect">
+            <a:avLst/>
+          </a:prstGeom>
+          <a:noFill/>
+          <a:ln w="9525">
+            <a:noFill/>
+            <a:miter lim="800000"/>
+            <a:headEnd/>
+            <a:tailEnd/>
+          </a:ln>
+        </p:spPr>
+      </p:pic>
+      <p:pic>
+        <p:nvPicPr>
+          <p:cNvPr id="6147" name="Picture 3"/>
+          <p:cNvPicPr>
+            <a:picLocks noChangeAspect="1" noChangeArrowheads="1"/>
+          </p:cNvPicPr>
+          <p:nvPr/>
+        </p:nvPicPr>
+        <p:blipFill>
+          <a:blip r:embed="rId3" cstate="print"/>
+          <a:srcRect/>
+          <a:stretch>
+            <a:fillRect/>
+          </a:stretch>
+        </p:blipFill>
+        <p:spPr bwMode="auto">
+          <a:xfrm>
+            <a:off x="228600" y="4267200"/>
+            <a:ext cx="7772400" cy="1852360"/>
+          </a:xfrm>
+          <a:prstGeom prst="rect">
+            <a:avLst/>
+          </a:prstGeom>
+          <a:noFill/>
+          <a:ln w="9525">
+            <a:noFill/>
+            <a:miter lim="800000"/>
+            <a:headEnd/>
+            <a:tailEnd/>
+          </a:ln>
+        </p:spPr>
+      </p:pic>
+    </p:spTree>
+  </p:cSld>
+  <p:clrMapOvr>
+    <a:masterClrMapping/>
+  </p:clrMapOvr>
+</p:sld>
+</file>
+
+<file path=ppt/slides/slide13.xml><?xml version="1.0" encoding="utf-8"?>
+<p:sld xmlns:a="http://schemas.openxmlformats.org/drawingml/2006/main" xmlns:r="http://schemas.openxmlformats.org/officeDocument/2006/relationships" xmlns:p="http://schemas.openxmlformats.org/presentationml/2006/main">
+  <p:cSld>
+    <p:spTree>
+      <p:nvGrpSpPr>
+        <p:cNvPr id="1" name=""/>
+        <p:cNvGrpSpPr/>
+        <p:nvPr/>
+      </p:nvGrpSpPr>
+      <p:grpSpPr>
+        <a:xfrm>
+          <a:off x="0" y="0"/>
+          <a:ext cx="0" cy="0"/>
+          <a:chOff x="0" y="0"/>
+          <a:chExt cx="0" cy="0"/>
+        </a:xfrm>
+      </p:grpSpPr>
+      <p:sp>
+        <p:nvSpPr>
+          <p:cNvPr id="2" name="Title 1"/>
+          <p:cNvSpPr>
+            <a:spLocks noGrp="1"/>
+          </p:cNvSpPr>
+          <p:nvPr>
+            <p:ph type="title"/>
+          </p:nvPr>
+        </p:nvSpPr>
+        <p:spPr>
+          <a:xfrm>
+            <a:off x="457200" y="274638"/>
+            <a:ext cx="7467600" cy="715962"/>
+          </a:xfrm>
+        </p:spPr>
+        <p:txBody>
+          <a:bodyPr/>
+          <a:lstStyle/>
+          <a:p>
+            <a:r>
+              <a:rPr lang="en-IN" dirty="0" smtClean="0"/>
+              <a:t>Grade D</a:t>
+            </a:r>
+            <a:endParaRPr lang="en-US" dirty="0"/>
+          </a:p>
+        </p:txBody>
+      </p:sp>
+      <p:pic>
+        <p:nvPicPr>
+          <p:cNvPr id="7170" name="Picture 2"/>
+          <p:cNvPicPr>
+            <a:picLocks noChangeAspect="1" noChangeArrowheads="1"/>
+          </p:cNvPicPr>
+          <p:nvPr/>
+        </p:nvPicPr>
+        <p:blipFill>
+          <a:blip r:embed="rId2" cstate="print"/>
+          <a:srcRect/>
+          <a:stretch>
+            <a:fillRect/>
+          </a:stretch>
+        </p:blipFill>
+        <p:spPr bwMode="auto">
+          <a:xfrm>
+            <a:off x="228600" y="1066800"/>
+            <a:ext cx="8382000" cy="3042251"/>
+          </a:xfrm>
+          <a:prstGeom prst="rect">
+            <a:avLst/>
+          </a:prstGeom>
+          <a:noFill/>
+          <a:ln w="9525">
+            <a:noFill/>
+            <a:miter lim="800000"/>
+            <a:headEnd/>
+            <a:tailEnd/>
+          </a:ln>
+        </p:spPr>
+      </p:pic>
+      <p:pic>
+        <p:nvPicPr>
+          <p:cNvPr id="7171" name="Picture 3"/>
+          <p:cNvPicPr>
+            <a:picLocks noChangeAspect="1" noChangeArrowheads="1"/>
+          </p:cNvPicPr>
+          <p:nvPr/>
+        </p:nvPicPr>
+        <p:blipFill>
+          <a:blip r:embed="rId3" cstate="print"/>
+          <a:srcRect/>
+          <a:stretch>
+            <a:fillRect/>
+          </a:stretch>
+        </p:blipFill>
+        <p:spPr bwMode="auto">
+          <a:xfrm>
+            <a:off x="609600" y="4343400"/>
+            <a:ext cx="7391400" cy="1809291"/>
+          </a:xfrm>
+          <a:prstGeom prst="rect">
+            <a:avLst/>
+          </a:prstGeom>
+          <a:noFill/>
+          <a:ln w="9525">
+            <a:noFill/>
+            <a:miter lim="800000"/>
+            <a:headEnd/>
+            <a:tailEnd/>
+          </a:ln>
+        </p:spPr>
+      </p:pic>
+    </p:spTree>
+  </p:cSld>
+  <p:clrMapOvr>
+    <a:masterClrMapping/>
+  </p:clrMapOvr>
+</p:sld>
+</file>
+
+<file path=ppt/slides/slide14.xml><?xml version="1.0" encoding="utf-8"?>
+<p:sld xmlns:a="http://schemas.openxmlformats.org/drawingml/2006/main" xmlns:r="http://schemas.openxmlformats.org/officeDocument/2006/relationships" xmlns:p="http://schemas.openxmlformats.org/presentationml/2006/main">
+  <p:cSld>
+    <p:spTree>
+      <p:nvGrpSpPr>
+        <p:cNvPr id="1" name=""/>
+        <p:cNvGrpSpPr/>
+        <p:nvPr/>
+      </p:nvGrpSpPr>
+      <p:grpSpPr>
+        <a:xfrm>
+          <a:off x="0" y="0"/>
+          <a:ext cx="0" cy="0"/>
+          <a:chOff x="0" y="0"/>
+          <a:chExt cx="0" cy="0"/>
+        </a:xfrm>
+      </p:grpSpPr>
+      <p:sp>
+        <p:nvSpPr>
+          <p:cNvPr id="2" name="Title 1"/>
+          <p:cNvSpPr>
+            <a:spLocks noGrp="1"/>
+          </p:cNvSpPr>
+          <p:nvPr>
+            <p:ph type="title"/>
+          </p:nvPr>
+        </p:nvSpPr>
+        <p:spPr>
+          <a:xfrm>
+            <a:off x="457200" y="274638"/>
+            <a:ext cx="7467600" cy="792162"/>
+          </a:xfrm>
+        </p:spPr>
+        <p:txBody>
+          <a:bodyPr/>
+          <a:lstStyle/>
+          <a:p>
+            <a:r>
+              <a:rPr lang="en-IN" dirty="0" smtClean="0"/>
+              <a:t>Grade E</a:t>
+            </a:r>
+            <a:endParaRPr lang="en-US" dirty="0"/>
+          </a:p>
+        </p:txBody>
+      </p:sp>
+      <p:pic>
+        <p:nvPicPr>
+          <p:cNvPr id="8194" name="Picture 2"/>
+          <p:cNvPicPr>
+            <a:picLocks noChangeAspect="1" noChangeArrowheads="1"/>
+          </p:cNvPicPr>
+          <p:nvPr/>
+        </p:nvPicPr>
+        <p:blipFill>
+          <a:blip r:embed="rId2" cstate="print"/>
+          <a:srcRect/>
+          <a:stretch>
+            <a:fillRect/>
+          </a:stretch>
+        </p:blipFill>
+        <p:spPr bwMode="auto">
+          <a:xfrm>
+            <a:off x="609600" y="1219200"/>
+            <a:ext cx="7772400" cy="2794425"/>
+          </a:xfrm>
+          <a:prstGeom prst="rect">
+            <a:avLst/>
+          </a:prstGeom>
+          <a:noFill/>
+          <a:ln w="9525">
+            <a:noFill/>
+            <a:miter lim="800000"/>
+            <a:headEnd/>
+            <a:tailEnd/>
+          </a:ln>
+        </p:spPr>
+      </p:pic>
+      <p:pic>
+        <p:nvPicPr>
+          <p:cNvPr id="8195" name="Picture 3"/>
+          <p:cNvPicPr>
+            <a:picLocks noChangeAspect="1" noChangeArrowheads="1"/>
+          </p:cNvPicPr>
+          <p:nvPr/>
+        </p:nvPicPr>
+        <p:blipFill>
+          <a:blip r:embed="rId3" cstate="print"/>
+          <a:srcRect/>
+          <a:stretch>
+            <a:fillRect/>
+          </a:stretch>
+        </p:blipFill>
+        <p:spPr bwMode="auto">
+          <a:xfrm>
+            <a:off x="228600" y="3962400"/>
+            <a:ext cx="7891463" cy="1939906"/>
+          </a:xfrm>
+          <a:prstGeom prst="rect">
+            <a:avLst/>
+          </a:prstGeom>
+          <a:noFill/>
+          <a:ln w="9525">
+            <a:noFill/>
+            <a:miter lim="800000"/>
+            <a:headEnd/>
+            <a:tailEnd/>
+          </a:ln>
+        </p:spPr>
+      </p:pic>
+    </p:spTree>
+  </p:cSld>
+  <p:clrMapOvr>
+    <a:masterClrMapping/>
+  </p:clrMapOvr>
+</p:sld>
+</file>
+
+<file path=ppt/slides/slide15.xml><?xml version="1.0" encoding="utf-8"?>
+<p:sld xmlns:a="http://schemas.openxmlformats.org/drawingml/2006/main" xmlns:r="http://schemas.openxmlformats.org/officeDocument/2006/relationships" xmlns:p="http://schemas.openxmlformats.org/presentationml/2006/main">
+  <p:cSld>
+    <p:spTree>
+      <p:nvGrpSpPr>
+        <p:cNvPr id="1" name=""/>
+        <p:cNvGrpSpPr/>
+        <p:nvPr/>
+      </p:nvGrpSpPr>
+      <p:grpSpPr>
+        <a:xfrm>
+          <a:off x="0" y="0"/>
+          <a:ext cx="0" cy="0"/>
+          <a:chOff x="0" y="0"/>
+          <a:chExt cx="0" cy="0"/>
+        </a:xfrm>
+      </p:grpSpPr>
+      <p:sp>
+        <p:nvSpPr>
+          <p:cNvPr id="2" name="Title 1"/>
+          <p:cNvSpPr>
+            <a:spLocks noGrp="1"/>
+          </p:cNvSpPr>
+          <p:nvPr>
+            <p:ph type="title"/>
+          </p:nvPr>
+        </p:nvSpPr>
+        <p:spPr>
+          <a:xfrm>
+            <a:off x="457200" y="274638"/>
+            <a:ext cx="7467600" cy="715962"/>
+          </a:xfrm>
+        </p:spPr>
+        <p:txBody>
+          <a:bodyPr/>
+          <a:lstStyle/>
+          <a:p>
+            <a:r>
+              <a:rPr lang="en-IN" dirty="0" smtClean="0"/>
+              <a:t>Grade F</a:t>
+            </a:r>
+            <a:endParaRPr lang="en-US" dirty="0"/>
+          </a:p>
+        </p:txBody>
+      </p:sp>
+      <p:pic>
+        <p:nvPicPr>
+          <p:cNvPr id="9218" name="Picture 2"/>
+          <p:cNvPicPr>
+            <a:picLocks noChangeAspect="1" noChangeArrowheads="1"/>
+          </p:cNvPicPr>
+          <p:nvPr/>
+        </p:nvPicPr>
+        <p:blipFill>
+          <a:blip r:embed="rId2" cstate="print"/>
+          <a:srcRect/>
+          <a:stretch>
+            <a:fillRect/>
+          </a:stretch>
+        </p:blipFill>
+        <p:spPr bwMode="auto">
+          <a:xfrm>
+            <a:off x="533400" y="1295400"/>
+            <a:ext cx="7921363" cy="3028950"/>
+          </a:xfrm>
+          <a:prstGeom prst="rect">
+            <a:avLst/>
+          </a:prstGeom>
+          <a:noFill/>
+          <a:ln w="9525">
+            <a:noFill/>
+            <a:miter lim="800000"/>
+            <a:headEnd/>
+            <a:tailEnd/>
+          </a:ln>
+        </p:spPr>
+      </p:pic>
+      <p:pic>
+        <p:nvPicPr>
+          <p:cNvPr id="9219" name="Picture 3"/>
+          <p:cNvPicPr>
+            <a:picLocks noChangeAspect="1" noChangeArrowheads="1"/>
+          </p:cNvPicPr>
+          <p:nvPr/>
+        </p:nvPicPr>
+        <p:blipFill>
+          <a:blip r:embed="rId3" cstate="print"/>
+          <a:srcRect/>
+          <a:stretch>
+            <a:fillRect/>
+          </a:stretch>
+        </p:blipFill>
+        <p:spPr bwMode="auto">
+          <a:xfrm>
+            <a:off x="457200" y="4495800"/>
+            <a:ext cx="7367588" cy="1729311"/>
+          </a:xfrm>
+          <a:prstGeom prst="rect">
+            <a:avLst/>
+          </a:prstGeom>
+          <a:noFill/>
+          <a:ln w="9525">
+            <a:noFill/>
+            <a:miter lim="800000"/>
+            <a:headEnd/>
+            <a:tailEnd/>
+          </a:ln>
+        </p:spPr>
+      </p:pic>
+    </p:spTree>
+  </p:cSld>
+  <p:clrMapOvr>
+    <a:masterClrMapping/>
+  </p:clrMapOvr>
+</p:sld>
+</file>
+
+<file path=ppt/slides/slide16.xml><?xml version="1.0" encoding="utf-8"?>
+<p:sld xmlns:a="http://schemas.openxmlformats.org/drawingml/2006/main" xmlns:r="http://schemas.openxmlformats.org/officeDocument/2006/relationships" xmlns:p="http://schemas.openxmlformats.org/presentationml/2006/main">
+  <p:cSld>
+    <p:spTree>
+      <p:nvGrpSpPr>
+        <p:cNvPr id="1" name=""/>
+        <p:cNvGrpSpPr/>
+        <p:nvPr/>
+      </p:nvGrpSpPr>
+      <p:grpSpPr>
+        <a:xfrm>
+          <a:off x="0" y="0"/>
+          <a:ext cx="0" cy="0"/>
+          <a:chOff x="0" y="0"/>
+          <a:chExt cx="0" cy="0"/>
+        </a:xfrm>
+      </p:grpSpPr>
+      <p:sp>
+        <p:nvSpPr>
+          <p:cNvPr id="2" name="Title 1"/>
+          <p:cNvSpPr>
+            <a:spLocks noGrp="1"/>
+          </p:cNvSpPr>
+          <p:nvPr>
+            <p:ph type="title"/>
+          </p:nvPr>
+        </p:nvSpPr>
+        <p:spPr>
+          <a:xfrm>
+            <a:off x="457200" y="274638"/>
+            <a:ext cx="7467600" cy="639762"/>
+          </a:xfrm>
+        </p:spPr>
+        <p:txBody>
+          <a:bodyPr/>
+          <a:lstStyle/>
+          <a:p>
+            <a:r>
+              <a:rPr lang="en-IN" dirty="0" smtClean="0"/>
+              <a:t>Grade G</a:t>
+            </a:r>
+            <a:endParaRPr lang="en-US" dirty="0"/>
+          </a:p>
+        </p:txBody>
+      </p:sp>
+      <p:pic>
+        <p:nvPicPr>
+          <p:cNvPr id="10242" name="Picture 2"/>
+          <p:cNvPicPr>
+            <a:picLocks noChangeAspect="1" noChangeArrowheads="1"/>
+          </p:cNvPicPr>
+          <p:nvPr/>
+        </p:nvPicPr>
+        <p:blipFill>
+          <a:blip r:embed="rId2" cstate="print"/>
+          <a:srcRect/>
+          <a:stretch>
+            <a:fillRect/>
+          </a:stretch>
+        </p:blipFill>
+        <p:spPr bwMode="auto">
+          <a:xfrm>
+            <a:off x="228600" y="4038600"/>
+            <a:ext cx="7851196" cy="1914454"/>
+          </a:xfrm>
+          <a:prstGeom prst="rect">
+            <a:avLst/>
+          </a:prstGeom>
+          <a:noFill/>
+          <a:ln w="9525">
+            <a:noFill/>
+            <a:miter lim="800000"/>
+            <a:headEnd/>
+            <a:tailEnd/>
+          </a:ln>
+        </p:spPr>
+      </p:pic>
+      <p:pic>
+        <p:nvPicPr>
+          <p:cNvPr id="10243" name="Picture 3"/>
+          <p:cNvPicPr>
+            <a:picLocks noChangeAspect="1" noChangeArrowheads="1"/>
+          </p:cNvPicPr>
+          <p:nvPr/>
+        </p:nvPicPr>
+        <p:blipFill>
+          <a:blip r:embed="rId3" cstate="print"/>
+          <a:srcRect/>
+          <a:stretch>
+            <a:fillRect/>
+          </a:stretch>
+        </p:blipFill>
+        <p:spPr bwMode="auto">
+          <a:xfrm>
+            <a:off x="914400" y="1295400"/>
+            <a:ext cx="7076726" cy="2438400"/>
+          </a:xfrm>
+          <a:prstGeom prst="rect">
+            <a:avLst/>
+          </a:prstGeom>
+          <a:noFill/>
+          <a:ln w="9525">
+            <a:noFill/>
+            <a:miter lim="800000"/>
+            <a:headEnd/>
+            <a:tailEnd/>
+          </a:ln>
+        </p:spPr>
+      </p:pic>
+    </p:spTree>
+  </p:cSld>
+  <p:clrMapOvr>
+    <a:masterClrMapping/>
+  </p:clrMapOvr>
+</p:sld>
+</file>
+
+<file path=ppt/slides/slide17.xml><?xml version="1.0" encoding="utf-8"?>
+<p:sld xmlns:a="http://schemas.openxmlformats.org/drawingml/2006/main" xmlns:r="http://schemas.openxmlformats.org/officeDocument/2006/relationships" xmlns:p="http://schemas.openxmlformats.org/presentationml/2006/main">
+  <p:cSld>
+    <p:spTree>
+      <p:nvGrpSpPr>
+        <p:cNvPr id="1" name=""/>
+        <p:cNvGrpSpPr/>
+        <p:nvPr/>
+      </p:nvGrpSpPr>
+      <p:grpSpPr>
+        <a:xfrm>
+          <a:off x="0" y="0"/>
+          <a:ext cx="0" cy="0"/>
+          <a:chOff x="0" y="0"/>
+          <a:chExt cx="0" cy="0"/>
+        </a:xfrm>
+      </p:grpSpPr>
+      <p:sp>
+        <p:nvSpPr>
+          <p:cNvPr id="2" name="Title 1"/>
+          <p:cNvSpPr>
+            <a:spLocks noGrp="1"/>
+          </p:cNvSpPr>
+          <p:nvPr>
+            <p:ph type="title"/>
+          </p:nvPr>
+        </p:nvSpPr>
+        <p:spPr>
+          <a:xfrm>
+            <a:off x="457200" y="274638"/>
+            <a:ext cx="7467600" cy="639762"/>
+          </a:xfrm>
+        </p:spPr>
+        <p:txBody>
+          <a:bodyPr/>
+          <a:lstStyle/>
+          <a:p>
+            <a:r>
+              <a:rPr lang="en-IN" dirty="0" smtClean="0"/>
+              <a:t>Analysis</a:t>
+            </a:r>
+            <a:endParaRPr lang="en-US" dirty="0"/>
+          </a:p>
+        </p:txBody>
+      </p:sp>
+      <p:sp>
+        <p:nvSpPr>
+          <p:cNvPr id="3" name="Content Placeholder 2"/>
+          <p:cNvSpPr>
+            <a:spLocks noGrp="1"/>
+          </p:cNvSpPr>
+          <p:nvPr>
+            <p:ph sz="quarter" idx="1"/>
+          </p:nvPr>
+        </p:nvSpPr>
+        <p:spPr>
+          <a:xfrm>
+            <a:off x="381000" y="1143000"/>
+            <a:ext cx="7467600" cy="4873752"/>
+          </a:xfrm>
+        </p:spPr>
+        <p:txBody>
+          <a:bodyPr/>
+          <a:lstStyle/>
+          <a:p>
+            <a:r>
+              <a:rPr lang="en-IN" dirty="0" smtClean="0"/>
+              <a:t>Loan amounts are offered to high risk categories such as E, F and G higher than expected.</a:t>
+            </a:r>
+          </a:p>
+          <a:p>
+            <a:r>
+              <a:rPr lang="en-IN" dirty="0" smtClean="0"/>
+              <a:t>Loans given for small business purposes have observed to be the highest probable cause to get defaulted across all the grades. The probability increases with the risky categories.</a:t>
+            </a:r>
+          </a:p>
+          <a:p>
+            <a:r>
+              <a:rPr lang="en-IN" dirty="0" smtClean="0"/>
+              <a:t>Loans given for debt consolidation seems to be next probable factor to default the loan</a:t>
+            </a:r>
+          </a:p>
+          <a:p>
+            <a:r>
+              <a:rPr lang="en-IN" dirty="0" smtClean="0"/>
+              <a:t>For Grade E, loans given for car is the next probable factor to default the loan</a:t>
+            </a:r>
+          </a:p>
+          <a:p>
+            <a:r>
+              <a:rPr lang="en-IN" dirty="0" smtClean="0"/>
+              <a:t>For Grade F, loans given for medical purposes is the next probable factor to default the loan</a:t>
+            </a:r>
+            <a:endParaRPr lang="en-US" dirty="0"/>
+          </a:p>
+        </p:txBody>
+      </p:sp>
+    </p:spTree>
+  </p:cSld>
+  <p:clrMapOvr>
+    <a:masterClrMapping/>
+  </p:clrMapOvr>
+</p:sld>
+</file>
+
 <file path=ppt/slides/slide2.xml><?xml version="1.0" encoding="utf-8"?>
 <p:sld xmlns:a="http://schemas.openxmlformats.org/drawingml/2006/main" xmlns:r="http://schemas.openxmlformats.org/officeDocument/2006/relationships" xmlns:p="http://schemas.openxmlformats.org/presentationml/2006/main">
   <p:cSld>
@@ -5381,6 +6313,544 @@
             <a:r>
               <a:rPr lang="en-US" dirty="0" smtClean="0"/>
               <a:t>Developing strategies to mitigate risks associated with lending.</a:t>
+            </a:r>
+            <a:endParaRPr lang="en-US" dirty="0"/>
+          </a:p>
+        </p:txBody>
+      </p:sp>
+    </p:spTree>
+  </p:cSld>
+  <p:clrMapOvr>
+    <a:masterClrMapping/>
+  </p:clrMapOvr>
+</p:sld>
+</file>
+
+<file path=ppt/slides/slide5.xml><?xml version="1.0" encoding="utf-8"?>
+<p:sld xmlns:a="http://schemas.openxmlformats.org/drawingml/2006/main" xmlns:r="http://schemas.openxmlformats.org/officeDocument/2006/relationships" xmlns:p="http://schemas.openxmlformats.org/presentationml/2006/main">
+  <p:cSld>
+    <p:spTree>
+      <p:nvGrpSpPr>
+        <p:cNvPr id="1" name=""/>
+        <p:cNvGrpSpPr/>
+        <p:nvPr/>
+      </p:nvGrpSpPr>
+      <p:grpSpPr>
+        <a:xfrm>
+          <a:off x="0" y="0"/>
+          <a:ext cx="0" cy="0"/>
+          <a:chOff x="0" y="0"/>
+          <a:chExt cx="0" cy="0"/>
+        </a:xfrm>
+      </p:grpSpPr>
+      <p:sp>
+        <p:nvSpPr>
+          <p:cNvPr id="2" name="Title 1"/>
+          <p:cNvSpPr>
+            <a:spLocks noGrp="1"/>
+          </p:cNvSpPr>
+          <p:nvPr>
+            <p:ph type="title"/>
+          </p:nvPr>
+        </p:nvSpPr>
+        <p:spPr/>
+        <p:txBody>
+          <a:bodyPr/>
+          <a:lstStyle/>
+          <a:p>
+            <a:r>
+              <a:rPr lang="en-IN" dirty="0" smtClean="0"/>
+              <a:t>Pie Plot For </a:t>
+            </a:r>
+            <a:r>
+              <a:rPr lang="en-IN" dirty="0" smtClean="0"/>
+              <a:t>L</a:t>
+            </a:r>
+            <a:r>
+              <a:rPr lang="en-IN" dirty="0" smtClean="0"/>
+              <a:t>oan </a:t>
+            </a:r>
+            <a:r>
+              <a:rPr lang="en-IN" dirty="0" smtClean="0"/>
+              <a:t>S</a:t>
+            </a:r>
+            <a:r>
+              <a:rPr lang="en-IN" dirty="0" smtClean="0"/>
+              <a:t>tatus and Verification</a:t>
+            </a:r>
+            <a:endParaRPr lang="en-US" dirty="0"/>
+          </a:p>
+        </p:txBody>
+      </p:sp>
+      <p:pic>
+        <p:nvPicPr>
+          <p:cNvPr id="1026" name="Picture 2"/>
+          <p:cNvPicPr>
+            <a:picLocks noChangeAspect="1" noChangeArrowheads="1"/>
+          </p:cNvPicPr>
+          <p:nvPr/>
+        </p:nvPicPr>
+        <p:blipFill>
+          <a:blip r:embed="rId2" cstate="print"/>
+          <a:srcRect/>
+          <a:stretch>
+            <a:fillRect/>
+          </a:stretch>
+        </p:blipFill>
+        <p:spPr bwMode="auto">
+          <a:xfrm>
+            <a:off x="152400" y="1600200"/>
+            <a:ext cx="8362950" cy="3609975"/>
+          </a:xfrm>
+          <a:prstGeom prst="rect">
+            <a:avLst/>
+          </a:prstGeom>
+          <a:noFill/>
+          <a:ln w="9525">
+            <a:noFill/>
+            <a:miter lim="800000"/>
+            <a:headEnd/>
+            <a:tailEnd/>
+          </a:ln>
+        </p:spPr>
+      </p:pic>
+      <p:sp>
+        <p:nvSpPr>
+          <p:cNvPr id="5" name="TextBox 4"/>
+          <p:cNvSpPr txBox="1"/>
+          <p:nvPr/>
+        </p:nvSpPr>
+        <p:spPr>
+          <a:xfrm>
+            <a:off x="1066800" y="5638800"/>
+            <a:ext cx="3663182" cy="646331"/>
+          </a:xfrm>
+          <a:prstGeom prst="rect">
+            <a:avLst/>
+          </a:prstGeom>
+          <a:noFill/>
+        </p:spPr>
+        <p:txBody>
+          <a:bodyPr wrap="none" rtlCol="0">
+            <a:spAutoFit/>
+          </a:bodyPr>
+          <a:lstStyle/>
+          <a:p>
+            <a:pPr>
+              <a:buFont typeface="Arial" pitchFamily="34" charset="0"/>
+              <a:buChar char="•"/>
+            </a:pPr>
+            <a:r>
+              <a:rPr lang="en-IN" dirty="0" smtClean="0"/>
+              <a:t> 14% Loans are defaulted</a:t>
+            </a:r>
+          </a:p>
+          <a:p>
+            <a:pPr>
+              <a:buFont typeface="Arial" pitchFamily="34" charset="0"/>
+              <a:buChar char="•"/>
+            </a:pPr>
+            <a:r>
+              <a:rPr lang="en-IN" dirty="0" smtClean="0"/>
+              <a:t>  </a:t>
+            </a:r>
+            <a:r>
+              <a:rPr lang="en-IN" dirty="0" smtClean="0"/>
+              <a:t>Majority of loans are not verified</a:t>
+            </a:r>
+            <a:endParaRPr lang="en-US" dirty="0"/>
+          </a:p>
+        </p:txBody>
+      </p:sp>
+    </p:spTree>
+  </p:cSld>
+  <p:clrMapOvr>
+    <a:masterClrMapping/>
+  </p:clrMapOvr>
+</p:sld>
+</file>
+
+<file path=ppt/slides/slide6.xml><?xml version="1.0" encoding="utf-8"?>
+<p:sld xmlns:a="http://schemas.openxmlformats.org/drawingml/2006/main" xmlns:r="http://schemas.openxmlformats.org/officeDocument/2006/relationships" xmlns:p="http://schemas.openxmlformats.org/presentationml/2006/main">
+  <p:cSld>
+    <p:spTree>
+      <p:nvGrpSpPr>
+        <p:cNvPr id="1" name=""/>
+        <p:cNvGrpSpPr/>
+        <p:nvPr/>
+      </p:nvGrpSpPr>
+      <p:grpSpPr>
+        <a:xfrm>
+          <a:off x="0" y="0"/>
+          <a:ext cx="0" cy="0"/>
+          <a:chOff x="0" y="0"/>
+          <a:chExt cx="0" cy="0"/>
+        </a:xfrm>
+      </p:grpSpPr>
+      <p:sp>
+        <p:nvSpPr>
+          <p:cNvPr id="2" name="Title 1"/>
+          <p:cNvSpPr>
+            <a:spLocks noGrp="1"/>
+          </p:cNvSpPr>
+          <p:nvPr>
+            <p:ph type="title"/>
+          </p:nvPr>
+        </p:nvSpPr>
+        <p:spPr>
+          <a:xfrm>
+            <a:off x="457200" y="274638"/>
+            <a:ext cx="7467600" cy="639762"/>
+          </a:xfrm>
+        </p:spPr>
+        <p:txBody>
+          <a:bodyPr/>
+          <a:lstStyle/>
+          <a:p>
+            <a:r>
+              <a:rPr lang="en-IN" dirty="0" smtClean="0"/>
+              <a:t>Categorical  Analysis</a:t>
+            </a:r>
+            <a:endParaRPr lang="en-US" dirty="0"/>
+          </a:p>
+        </p:txBody>
+      </p:sp>
+      <p:pic>
+        <p:nvPicPr>
+          <p:cNvPr id="2050" name="Picture 2"/>
+          <p:cNvPicPr>
+            <a:picLocks noChangeAspect="1" noChangeArrowheads="1"/>
+          </p:cNvPicPr>
+          <p:nvPr/>
+        </p:nvPicPr>
+        <p:blipFill>
+          <a:blip r:embed="rId2" cstate="print"/>
+          <a:srcRect/>
+          <a:stretch>
+            <a:fillRect/>
+          </a:stretch>
+        </p:blipFill>
+        <p:spPr bwMode="auto">
+          <a:xfrm>
+            <a:off x="838200" y="990600"/>
+            <a:ext cx="6943725" cy="5276850"/>
+          </a:xfrm>
+          <a:prstGeom prst="rect">
+            <a:avLst/>
+          </a:prstGeom>
+          <a:noFill/>
+          <a:ln w="9525">
+            <a:noFill/>
+            <a:miter lim="800000"/>
+            <a:headEnd/>
+            <a:tailEnd/>
+          </a:ln>
+        </p:spPr>
+      </p:pic>
+    </p:spTree>
+  </p:cSld>
+  <p:clrMapOvr>
+    <a:masterClrMapping/>
+  </p:clrMapOvr>
+</p:sld>
+</file>
+
+<file path=ppt/slides/slide7.xml><?xml version="1.0" encoding="utf-8"?>
+<p:sld xmlns:a="http://schemas.openxmlformats.org/drawingml/2006/main" xmlns:r="http://schemas.openxmlformats.org/officeDocument/2006/relationships" xmlns:p="http://schemas.openxmlformats.org/presentationml/2006/main">
+  <p:cSld>
+    <p:spTree>
+      <p:nvGrpSpPr>
+        <p:cNvPr id="1" name=""/>
+        <p:cNvGrpSpPr/>
+        <p:nvPr/>
+      </p:nvGrpSpPr>
+      <p:grpSpPr>
+        <a:xfrm>
+          <a:off x="0" y="0"/>
+          <a:ext cx="0" cy="0"/>
+          <a:chOff x="0" y="0"/>
+          <a:chExt cx="0" cy="0"/>
+        </a:xfrm>
+      </p:grpSpPr>
+      <p:sp>
+        <p:nvSpPr>
+          <p:cNvPr id="2" name="Title 1"/>
+          <p:cNvSpPr>
+            <a:spLocks noGrp="1"/>
+          </p:cNvSpPr>
+          <p:nvPr>
+            <p:ph type="title"/>
+          </p:nvPr>
+        </p:nvSpPr>
+        <p:spPr/>
+        <p:txBody>
+          <a:bodyPr/>
+          <a:lstStyle/>
+          <a:p>
+            <a:r>
+              <a:rPr lang="en-IN" dirty="0" smtClean="0"/>
+              <a:t>Observations From Categorical Analysis</a:t>
+            </a:r>
+            <a:endParaRPr lang="en-US" dirty="0"/>
+          </a:p>
+        </p:txBody>
+      </p:sp>
+      <p:sp>
+        <p:nvSpPr>
+          <p:cNvPr id="3" name="Content Placeholder 2"/>
+          <p:cNvSpPr>
+            <a:spLocks noGrp="1"/>
+          </p:cNvSpPr>
+          <p:nvPr>
+            <p:ph sz="quarter" idx="1"/>
+          </p:nvPr>
+        </p:nvSpPr>
+        <p:spPr/>
+        <p:txBody>
+          <a:bodyPr/>
+          <a:lstStyle/>
+          <a:p>
+            <a:r>
+              <a:rPr lang="en-IN" dirty="0" smtClean="0"/>
+              <a:t>Majority of loans are concentrated in states like California, New York, Florida and Texas</a:t>
+            </a:r>
+          </a:p>
+          <a:p>
+            <a:endParaRPr lang="en-IN" dirty="0" smtClean="0"/>
+          </a:p>
+          <a:p>
+            <a:r>
+              <a:rPr lang="en-IN" dirty="0" smtClean="0"/>
+              <a:t>Majority of loan recipients are either living in the rented house or mortgaged their house</a:t>
+            </a:r>
+          </a:p>
+          <a:p>
+            <a:endParaRPr lang="en-IN" dirty="0" smtClean="0"/>
+          </a:p>
+          <a:p>
+            <a:r>
+              <a:rPr lang="en-IN" dirty="0" smtClean="0"/>
+              <a:t>Significant numbers of loans are issued towards debt consolidation which is calls for individual analysis of the loan purposes</a:t>
+            </a:r>
+            <a:endParaRPr lang="en-US" dirty="0"/>
+          </a:p>
+        </p:txBody>
+      </p:sp>
+    </p:spTree>
+  </p:cSld>
+  <p:clrMapOvr>
+    <a:masterClrMapping/>
+  </p:clrMapOvr>
+</p:sld>
+</file>
+
+<file path=ppt/slides/slide8.xml><?xml version="1.0" encoding="utf-8"?>
+<p:sld xmlns:a="http://schemas.openxmlformats.org/drawingml/2006/main" xmlns:r="http://schemas.openxmlformats.org/officeDocument/2006/relationships" xmlns:p="http://schemas.openxmlformats.org/presentationml/2006/main">
+  <p:cSld>
+    <p:spTree>
+      <p:nvGrpSpPr>
+        <p:cNvPr id="1" name=""/>
+        <p:cNvGrpSpPr/>
+        <p:nvPr/>
+      </p:nvGrpSpPr>
+      <p:grpSpPr>
+        <a:xfrm>
+          <a:off x="0" y="0"/>
+          <a:ext cx="0" cy="0"/>
+          <a:chOff x="0" y="0"/>
+          <a:chExt cx="0" cy="0"/>
+        </a:xfrm>
+      </p:grpSpPr>
+      <p:sp>
+        <p:nvSpPr>
+          <p:cNvPr id="2" name="Title 1"/>
+          <p:cNvSpPr>
+            <a:spLocks noGrp="1"/>
+          </p:cNvSpPr>
+          <p:nvPr>
+            <p:ph type="title"/>
+          </p:nvPr>
+        </p:nvSpPr>
+        <p:spPr/>
+        <p:txBody>
+          <a:bodyPr/>
+          <a:lstStyle/>
+          <a:p>
+            <a:r>
+              <a:rPr lang="en-IN" dirty="0" smtClean="0"/>
+              <a:t>Distribution Of Loans Amount With Respect To Purpose Grade</a:t>
+            </a:r>
+            <a:endParaRPr lang="en-US" dirty="0"/>
+          </a:p>
+        </p:txBody>
+      </p:sp>
+      <p:pic>
+        <p:nvPicPr>
+          <p:cNvPr id="3074" name="Picture 2"/>
+          <p:cNvPicPr>
+            <a:picLocks noChangeAspect="1" noChangeArrowheads="1"/>
+          </p:cNvPicPr>
+          <p:nvPr/>
+        </p:nvPicPr>
+        <p:blipFill>
+          <a:blip r:embed="rId2" cstate="print"/>
+          <a:srcRect/>
+          <a:stretch>
+            <a:fillRect/>
+          </a:stretch>
+        </p:blipFill>
+        <p:spPr bwMode="auto">
+          <a:xfrm>
+            <a:off x="381000" y="1905000"/>
+            <a:ext cx="8229600" cy="2504661"/>
+          </a:xfrm>
+          <a:prstGeom prst="rect">
+            <a:avLst/>
+          </a:prstGeom>
+          <a:noFill/>
+          <a:ln w="9525">
+            <a:noFill/>
+            <a:miter lim="800000"/>
+            <a:headEnd/>
+            <a:tailEnd/>
+          </a:ln>
+        </p:spPr>
+      </p:pic>
+      <p:sp>
+        <p:nvSpPr>
+          <p:cNvPr id="5" name="TextBox 4"/>
+          <p:cNvSpPr txBox="1"/>
+          <p:nvPr/>
+        </p:nvSpPr>
+        <p:spPr>
+          <a:xfrm>
+            <a:off x="533400" y="4648200"/>
+            <a:ext cx="7543800" cy="1287532"/>
+          </a:xfrm>
+          <a:prstGeom prst="rect">
+            <a:avLst/>
+          </a:prstGeom>
+          <a:noFill/>
+        </p:spPr>
+        <p:txBody>
+          <a:bodyPr wrap="square" rtlCol="0">
+            <a:spAutoFit/>
+          </a:bodyPr>
+          <a:lstStyle/>
+          <a:p>
+            <a:pPr>
+              <a:lnSpc>
+                <a:spcPct val="150000"/>
+              </a:lnSpc>
+              <a:buFont typeface="Arial" pitchFamily="34" charset="0"/>
+              <a:buChar char="•"/>
+            </a:pPr>
+            <a:r>
+              <a:rPr lang="en-IN" dirty="0" smtClean="0"/>
+              <a:t> Looking at median and quartile values, it is observed that high risk categories like E, F and G are offered higher amounts of loans compared to low risk categories</a:t>
+            </a:r>
+            <a:endParaRPr lang="en-US" dirty="0"/>
+          </a:p>
+        </p:txBody>
+      </p:sp>
+    </p:spTree>
+  </p:cSld>
+  <p:clrMapOvr>
+    <a:masterClrMapping/>
+  </p:clrMapOvr>
+</p:sld>
+</file>
+
+<file path=ppt/slides/slide9.xml><?xml version="1.0" encoding="utf-8"?>
+<p:sld xmlns:a="http://schemas.openxmlformats.org/drawingml/2006/main" xmlns:r="http://schemas.openxmlformats.org/officeDocument/2006/relationships" xmlns:p="http://schemas.openxmlformats.org/presentationml/2006/main">
+  <p:cSld>
+    <p:spTree>
+      <p:nvGrpSpPr>
+        <p:cNvPr id="1" name=""/>
+        <p:cNvGrpSpPr/>
+        <p:nvPr/>
+      </p:nvGrpSpPr>
+      <p:grpSpPr>
+        <a:xfrm>
+          <a:off x="0" y="0"/>
+          <a:ext cx="0" cy="0"/>
+          <a:chOff x="0" y="0"/>
+          <a:chExt cx="0" cy="0"/>
+        </a:xfrm>
+      </p:grpSpPr>
+      <p:sp>
+        <p:nvSpPr>
+          <p:cNvPr id="2" name="Title 1"/>
+          <p:cNvSpPr>
+            <a:spLocks noGrp="1"/>
+          </p:cNvSpPr>
+          <p:nvPr>
+            <p:ph type="title"/>
+          </p:nvPr>
+        </p:nvSpPr>
+        <p:spPr>
+          <a:xfrm>
+            <a:off x="457200" y="274638"/>
+            <a:ext cx="7467600" cy="563562"/>
+          </a:xfrm>
+        </p:spPr>
+        <p:txBody>
+          <a:bodyPr/>
+          <a:lstStyle/>
+          <a:p>
+            <a:r>
+              <a:rPr lang="en-IN" dirty="0" smtClean="0"/>
+              <a:t>Further Strategy Of Analysis</a:t>
+            </a:r>
+            <a:endParaRPr lang="en-US" dirty="0"/>
+          </a:p>
+        </p:txBody>
+      </p:sp>
+      <p:sp>
+        <p:nvSpPr>
+          <p:cNvPr id="3" name="Content Placeholder 2"/>
+          <p:cNvSpPr>
+            <a:spLocks noGrp="1"/>
+          </p:cNvSpPr>
+          <p:nvPr>
+            <p:ph sz="quarter" idx="1"/>
+          </p:nvPr>
+        </p:nvSpPr>
+        <p:spPr/>
+        <p:txBody>
+          <a:bodyPr/>
+          <a:lstStyle/>
+          <a:p>
+            <a:pPr>
+              <a:lnSpc>
+                <a:spcPct val="150000"/>
+              </a:lnSpc>
+            </a:pPr>
+            <a:r>
+              <a:rPr lang="en-IN" dirty="0" smtClean="0"/>
+              <a:t>Data will be filtered for top four states</a:t>
+            </a:r>
+          </a:p>
+          <a:p>
+            <a:pPr>
+              <a:lnSpc>
+                <a:spcPct val="150000"/>
+              </a:lnSpc>
+            </a:pPr>
+            <a:r>
+              <a:rPr lang="en-IN" dirty="0" smtClean="0"/>
+              <a:t>Grade wise analysis will be done to identify top three purposes where amount of loans are provided higher than expected</a:t>
+            </a:r>
+          </a:p>
+          <a:p>
+            <a:pPr>
+              <a:lnSpc>
+                <a:spcPct val="150000"/>
+              </a:lnSpc>
+            </a:pPr>
+            <a:r>
+              <a:rPr lang="en-IN" dirty="0" smtClean="0"/>
+              <a:t>Default rate will be analysed for top three purposes for each category</a:t>
             </a:r>
             <a:endParaRPr lang="en-US" dirty="0"/>
           </a:p>

</xml_diff>